<commit_message>
Add latest changes from presentation
</commit_message>
<xml_diff>
--- a/201810 - PSUG/PowerCLI/VMware PowerCLI.pptx
+++ b/201810 - PSUG/PowerCLI/VMware PowerCLI.pptx
@@ -258,7 +258,7 @@
           <a:p>
             <a:fld id="{106DEEE4-BF91-4C82-8764-B4C90083F5A9}" type="datetimeFigureOut">
               <a:rPr lang="de-DE" smtClean="0"/>
-              <a:t>27.09.2018</a:t>
+              <a:t>01.10.2018</a:t>
             </a:fld>
             <a:endParaRPr lang="de-DE"/>
           </a:p>
@@ -428,7 +428,7 @@
           <a:p>
             <a:fld id="{106DEEE4-BF91-4C82-8764-B4C90083F5A9}" type="datetimeFigureOut">
               <a:rPr lang="de-DE" smtClean="0"/>
-              <a:t>27.09.2018</a:t>
+              <a:t>01.10.2018</a:t>
             </a:fld>
             <a:endParaRPr lang="de-DE"/>
           </a:p>
@@ -608,7 +608,7 @@
           <a:p>
             <a:fld id="{106DEEE4-BF91-4C82-8764-B4C90083F5A9}" type="datetimeFigureOut">
               <a:rPr lang="de-DE" smtClean="0"/>
-              <a:t>27.09.2018</a:t>
+              <a:t>01.10.2018</a:t>
             </a:fld>
             <a:endParaRPr lang="de-DE"/>
           </a:p>
@@ -778,7 +778,7 @@
           <a:p>
             <a:fld id="{106DEEE4-BF91-4C82-8764-B4C90083F5A9}" type="datetimeFigureOut">
               <a:rPr lang="de-DE" smtClean="0"/>
-              <a:t>27.09.2018</a:t>
+              <a:t>01.10.2018</a:t>
             </a:fld>
             <a:endParaRPr lang="de-DE"/>
           </a:p>
@@ -1024,7 +1024,7 @@
           <a:p>
             <a:fld id="{106DEEE4-BF91-4C82-8764-B4C90083F5A9}" type="datetimeFigureOut">
               <a:rPr lang="de-DE" smtClean="0"/>
-              <a:t>27.09.2018</a:t>
+              <a:t>01.10.2018</a:t>
             </a:fld>
             <a:endParaRPr lang="de-DE"/>
           </a:p>
@@ -1256,7 +1256,7 @@
           <a:p>
             <a:fld id="{106DEEE4-BF91-4C82-8764-B4C90083F5A9}" type="datetimeFigureOut">
               <a:rPr lang="de-DE" smtClean="0"/>
-              <a:t>27.09.2018</a:t>
+              <a:t>01.10.2018</a:t>
             </a:fld>
             <a:endParaRPr lang="de-DE"/>
           </a:p>
@@ -1623,7 +1623,7 @@
           <a:p>
             <a:fld id="{106DEEE4-BF91-4C82-8764-B4C90083F5A9}" type="datetimeFigureOut">
               <a:rPr lang="de-DE" smtClean="0"/>
-              <a:t>27.09.2018</a:t>
+              <a:t>01.10.2018</a:t>
             </a:fld>
             <a:endParaRPr lang="de-DE"/>
           </a:p>
@@ -1741,7 +1741,7 @@
           <a:p>
             <a:fld id="{106DEEE4-BF91-4C82-8764-B4C90083F5A9}" type="datetimeFigureOut">
               <a:rPr lang="de-DE" smtClean="0"/>
-              <a:t>27.09.2018</a:t>
+              <a:t>01.10.2018</a:t>
             </a:fld>
             <a:endParaRPr lang="de-DE"/>
           </a:p>
@@ -1836,7 +1836,7 @@
           <a:p>
             <a:fld id="{106DEEE4-BF91-4C82-8764-B4C90083F5A9}" type="datetimeFigureOut">
               <a:rPr lang="de-DE" smtClean="0"/>
-              <a:t>27.09.2018</a:t>
+              <a:t>01.10.2018</a:t>
             </a:fld>
             <a:endParaRPr lang="de-DE"/>
           </a:p>
@@ -2113,7 +2113,7 @@
           <a:p>
             <a:fld id="{106DEEE4-BF91-4C82-8764-B4C90083F5A9}" type="datetimeFigureOut">
               <a:rPr lang="de-DE" smtClean="0"/>
-              <a:t>27.09.2018</a:t>
+              <a:t>01.10.2018</a:t>
             </a:fld>
             <a:endParaRPr lang="de-DE"/>
           </a:p>
@@ -2366,7 +2366,7 @@
           <a:p>
             <a:fld id="{106DEEE4-BF91-4C82-8764-B4C90083F5A9}" type="datetimeFigureOut">
               <a:rPr lang="de-DE" smtClean="0"/>
-              <a:t>27.09.2018</a:t>
+              <a:t>01.10.2018</a:t>
             </a:fld>
             <a:endParaRPr lang="de-DE"/>
           </a:p>
@@ -2579,7 +2579,7 @@
           <a:p>
             <a:fld id="{106DEEE4-BF91-4C82-8764-B4C90083F5A9}" type="datetimeFigureOut">
               <a:rPr lang="de-DE" smtClean="0"/>
-              <a:t>27.09.2018</a:t>
+              <a:t>01.10.2018</a:t>
             </a:fld>
             <a:endParaRPr lang="de-DE"/>
           </a:p>
@@ -9461,7 +9461,23 @@
           <a:p>
             <a:r>
               <a:rPr lang="de-DE" dirty="0" smtClean="0"/>
-              <a:t>Das Haupt-Modul ist für </a:t>
+              <a:t>The Core-Module </a:t>
+            </a:r>
+            <a:r>
+              <a:rPr lang="de-DE" dirty="0" err="1" smtClean="0"/>
+              <a:t>is</a:t>
+            </a:r>
+            <a:r>
+              <a:rPr lang="de-DE" dirty="0" smtClean="0"/>
+              <a:t> </a:t>
+            </a:r>
+            <a:r>
+              <a:rPr lang="de-DE" dirty="0" err="1" smtClean="0"/>
+              <a:t>for</a:t>
+            </a:r>
+            <a:r>
+              <a:rPr lang="de-DE" dirty="0" smtClean="0"/>
+              <a:t> </a:t>
             </a:r>
             <a:r>
               <a:rPr lang="de-DE" b="1" dirty="0" smtClean="0"/>

</xml_diff>

<commit_message>
Fix ESXCLI DS Path
</commit_message>
<xml_diff>
--- a/201810 - PSUG/PowerCLI/VMware PowerCLI.pptx
+++ b/201810 - PSUG/PowerCLI/VMware PowerCLI.pptx
@@ -258,7 +258,7 @@
           <a:p>
             <a:fld id="{106DEEE4-BF91-4C82-8764-B4C90083F5A9}" type="datetimeFigureOut">
               <a:rPr lang="de-DE" smtClean="0"/>
-              <a:t>01.10.2018</a:t>
+              <a:t>08.10.2018</a:t>
             </a:fld>
             <a:endParaRPr lang="de-DE"/>
           </a:p>
@@ -428,7 +428,7 @@
           <a:p>
             <a:fld id="{106DEEE4-BF91-4C82-8764-B4C90083F5A9}" type="datetimeFigureOut">
               <a:rPr lang="de-DE" smtClean="0"/>
-              <a:t>01.10.2018</a:t>
+              <a:t>08.10.2018</a:t>
             </a:fld>
             <a:endParaRPr lang="de-DE"/>
           </a:p>
@@ -608,7 +608,7 @@
           <a:p>
             <a:fld id="{106DEEE4-BF91-4C82-8764-B4C90083F5A9}" type="datetimeFigureOut">
               <a:rPr lang="de-DE" smtClean="0"/>
-              <a:t>01.10.2018</a:t>
+              <a:t>08.10.2018</a:t>
             </a:fld>
             <a:endParaRPr lang="de-DE"/>
           </a:p>
@@ -778,7 +778,7 @@
           <a:p>
             <a:fld id="{106DEEE4-BF91-4C82-8764-B4C90083F5A9}" type="datetimeFigureOut">
               <a:rPr lang="de-DE" smtClean="0"/>
-              <a:t>01.10.2018</a:t>
+              <a:t>08.10.2018</a:t>
             </a:fld>
             <a:endParaRPr lang="de-DE"/>
           </a:p>
@@ -1024,7 +1024,7 @@
           <a:p>
             <a:fld id="{106DEEE4-BF91-4C82-8764-B4C90083F5A9}" type="datetimeFigureOut">
               <a:rPr lang="de-DE" smtClean="0"/>
-              <a:t>01.10.2018</a:t>
+              <a:t>08.10.2018</a:t>
             </a:fld>
             <a:endParaRPr lang="de-DE"/>
           </a:p>
@@ -1256,7 +1256,7 @@
           <a:p>
             <a:fld id="{106DEEE4-BF91-4C82-8764-B4C90083F5A9}" type="datetimeFigureOut">
               <a:rPr lang="de-DE" smtClean="0"/>
-              <a:t>01.10.2018</a:t>
+              <a:t>08.10.2018</a:t>
             </a:fld>
             <a:endParaRPr lang="de-DE"/>
           </a:p>
@@ -1623,7 +1623,7 @@
           <a:p>
             <a:fld id="{106DEEE4-BF91-4C82-8764-B4C90083F5A9}" type="datetimeFigureOut">
               <a:rPr lang="de-DE" smtClean="0"/>
-              <a:t>01.10.2018</a:t>
+              <a:t>08.10.2018</a:t>
             </a:fld>
             <a:endParaRPr lang="de-DE"/>
           </a:p>
@@ -1741,7 +1741,7 @@
           <a:p>
             <a:fld id="{106DEEE4-BF91-4C82-8764-B4C90083F5A9}" type="datetimeFigureOut">
               <a:rPr lang="de-DE" smtClean="0"/>
-              <a:t>01.10.2018</a:t>
+              <a:t>08.10.2018</a:t>
             </a:fld>
             <a:endParaRPr lang="de-DE"/>
           </a:p>
@@ -1836,7 +1836,7 @@
           <a:p>
             <a:fld id="{106DEEE4-BF91-4C82-8764-B4C90083F5A9}" type="datetimeFigureOut">
               <a:rPr lang="de-DE" smtClean="0"/>
-              <a:t>01.10.2018</a:t>
+              <a:t>08.10.2018</a:t>
             </a:fld>
             <a:endParaRPr lang="de-DE"/>
           </a:p>
@@ -2113,7 +2113,7 @@
           <a:p>
             <a:fld id="{106DEEE4-BF91-4C82-8764-B4C90083F5A9}" type="datetimeFigureOut">
               <a:rPr lang="de-DE" smtClean="0"/>
-              <a:t>01.10.2018</a:t>
+              <a:t>08.10.2018</a:t>
             </a:fld>
             <a:endParaRPr lang="de-DE"/>
           </a:p>
@@ -2366,7 +2366,7 @@
           <a:p>
             <a:fld id="{106DEEE4-BF91-4C82-8764-B4C90083F5A9}" type="datetimeFigureOut">
               <a:rPr lang="de-DE" smtClean="0"/>
-              <a:t>01.10.2018</a:t>
+              <a:t>08.10.2018</a:t>
             </a:fld>
             <a:endParaRPr lang="de-DE"/>
           </a:p>
@@ -2579,7 +2579,7 @@
           <a:p>
             <a:fld id="{106DEEE4-BF91-4C82-8764-B4C90083F5A9}" type="datetimeFigureOut">
               <a:rPr lang="de-DE" smtClean="0"/>
-              <a:t>01.10.2018</a:t>
+              <a:t>08.10.2018</a:t>
             </a:fld>
             <a:endParaRPr lang="de-DE"/>
           </a:p>
@@ -4992,14 +4992,14 @@
       </p:sp>
       <p:sp>
         <p:nvSpPr>
-          <p:cNvPr id="3" name="Rechteck 2"/>
+          <p:cNvPr id="4" name="Rechteck 3"/>
           <p:cNvSpPr/>
           <p:nvPr/>
         </p:nvSpPr>
         <p:spPr>
           <a:xfrm>
-            <a:off x="653796" y="3762176"/>
-            <a:ext cx="10890504" cy="2862322"/>
+            <a:off x="838200" y="3595229"/>
+            <a:ext cx="8130540" cy="2677656"/>
           </a:xfrm>
           <a:prstGeom prst="rect">
             <a:avLst/>
@@ -5215,40 +5215,130 @@
               <a:t>$</a:t>
             </a:r>
             <a:r>
+              <a:rPr lang="de-DE" sz="1200" dirty="0">
+                <a:solidFill>
+                  <a:srgbClr val="9FCFF9"/>
+                </a:solidFill>
+                <a:latin typeface="Consolas" panose="020B0609020204030204" pitchFamily="49" charset="0"/>
+              </a:rPr>
+              <a:t>Datastore</a:t>
+            </a:r>
+            <a:r>
+              <a:rPr lang="de-DE" sz="1200" dirty="0">
+                <a:solidFill>
+                  <a:srgbClr val="EFEFEF"/>
+                </a:solidFill>
+                <a:latin typeface="Consolas" panose="020B0609020204030204" pitchFamily="49" charset="0"/>
+              </a:rPr>
+              <a:t> </a:t>
+            </a:r>
+            <a:r>
+              <a:rPr lang="de-DE" sz="1200" dirty="0">
+                <a:solidFill>
+                  <a:srgbClr val="399EF4"/>
+                </a:solidFill>
+                <a:latin typeface="Consolas" panose="020B0609020204030204" pitchFamily="49" charset="0"/>
+              </a:rPr>
+              <a:t>=</a:t>
+            </a:r>
+            <a:r>
+              <a:rPr lang="de-DE" sz="1200" dirty="0">
+                <a:solidFill>
+                  <a:srgbClr val="EFEFEF"/>
+                </a:solidFill>
+                <a:latin typeface="Consolas" panose="020B0609020204030204" pitchFamily="49" charset="0"/>
+              </a:rPr>
+              <a:t> </a:t>
+            </a:r>
+            <a:r>
+              <a:rPr lang="de-DE" sz="1200" dirty="0">
+                <a:solidFill>
+                  <a:srgbClr val="399EF4"/>
+                </a:solidFill>
+                <a:latin typeface="Consolas" panose="020B0609020204030204" pitchFamily="49" charset="0"/>
+              </a:rPr>
+              <a:t>$</a:t>
+            </a:r>
+            <a:r>
               <a:rPr lang="de-DE" sz="1200" dirty="0" err="1">
                 <a:solidFill>
                   <a:srgbClr val="9FCFF9"/>
                 </a:solidFill>
                 <a:latin typeface="Consolas" panose="020B0609020204030204" pitchFamily="49" charset="0"/>
               </a:rPr>
-              <a:t>HostPath</a:t>
-            </a:r>
-            <a:r>
-              <a:rPr lang="de-DE" sz="1200" dirty="0">
-                <a:solidFill>
-                  <a:srgbClr val="EFEFEF"/>
-                </a:solidFill>
-                <a:latin typeface="Consolas" panose="020B0609020204030204" pitchFamily="49" charset="0"/>
-              </a:rPr>
-              <a:t> </a:t>
-            </a:r>
-            <a:r>
-              <a:rPr lang="de-DE" sz="1200" dirty="0">
-                <a:solidFill>
-                  <a:srgbClr val="399EF4"/>
-                </a:solidFill>
-                <a:latin typeface="Consolas" panose="020B0609020204030204" pitchFamily="49" charset="0"/>
-              </a:rPr>
-              <a:t>=</a:t>
-            </a:r>
-            <a:r>
-              <a:rPr lang="de-DE" sz="1200" dirty="0">
-                <a:solidFill>
-                  <a:srgbClr val="EFEFEF"/>
-                </a:solidFill>
-                <a:latin typeface="Consolas" panose="020B0609020204030204" pitchFamily="49" charset="0"/>
-              </a:rPr>
-              <a:t> </a:t>
+              <a:t>VMHost</a:t>
+            </a:r>
+            <a:r>
+              <a:rPr lang="de-DE" sz="1200" dirty="0">
+                <a:solidFill>
+                  <a:srgbClr val="EFEFEF"/>
+                </a:solidFill>
+                <a:latin typeface="Consolas" panose="020B0609020204030204" pitchFamily="49" charset="0"/>
+              </a:rPr>
+              <a:t> </a:t>
+            </a:r>
+            <a:r>
+              <a:rPr lang="de-DE" sz="1200" dirty="0">
+                <a:solidFill>
+                  <a:srgbClr val="399EF4"/>
+                </a:solidFill>
+                <a:latin typeface="Consolas" panose="020B0609020204030204" pitchFamily="49" charset="0"/>
+              </a:rPr>
+              <a:t>|</a:t>
+            </a:r>
+            <a:r>
+              <a:rPr lang="de-DE" sz="1200" dirty="0">
+                <a:solidFill>
+                  <a:srgbClr val="EFEFEF"/>
+                </a:solidFill>
+                <a:latin typeface="Consolas" panose="020B0609020204030204" pitchFamily="49" charset="0"/>
+              </a:rPr>
+              <a:t> </a:t>
+            </a:r>
+            <a:r>
+              <a:rPr lang="de-DE" sz="1200" dirty="0" err="1">
+                <a:solidFill>
+                  <a:srgbClr val="FFF099"/>
+                </a:solidFill>
+                <a:latin typeface="Consolas" panose="020B0609020204030204" pitchFamily="49" charset="0"/>
+              </a:rPr>
+              <a:t>Get</a:t>
+            </a:r>
+            <a:r>
+              <a:rPr lang="de-DE" sz="1200" dirty="0">
+                <a:solidFill>
+                  <a:srgbClr val="FFF099"/>
+                </a:solidFill>
+                <a:latin typeface="Consolas" panose="020B0609020204030204" pitchFamily="49" charset="0"/>
+              </a:rPr>
+              <a:t>-Datastore</a:t>
+            </a:r>
+            <a:r>
+              <a:rPr lang="de-DE" sz="1200" dirty="0">
+                <a:solidFill>
+                  <a:srgbClr val="EFEFEF"/>
+                </a:solidFill>
+                <a:latin typeface="Consolas" panose="020B0609020204030204" pitchFamily="49" charset="0"/>
+              </a:rPr>
+              <a:t> </a:t>
+            </a:r>
+            <a:r>
+              <a:rPr lang="de-DE" sz="1200" dirty="0">
+                <a:solidFill>
+                  <a:srgbClr val="399EF4"/>
+                </a:solidFill>
+                <a:latin typeface="Consolas" panose="020B0609020204030204" pitchFamily="49" charset="0"/>
+              </a:rPr>
+              <a:t>-</a:t>
+            </a:r>
+            <a:r>
+              <a:rPr lang="de-DE" sz="1200" dirty="0">
+                <a:solidFill>
+                  <a:srgbClr val="EFEFEF"/>
+                </a:solidFill>
+                <a:latin typeface="Consolas" panose="020B0609020204030204" pitchFamily="49" charset="0"/>
+              </a:rPr>
+              <a:t>Name </a:t>
             </a:r>
             <a:r>
               <a:rPr lang="de-DE" sz="1200" dirty="0">
@@ -5266,188 +5356,7 @@
                 </a:solidFill>
                 <a:latin typeface="Consolas" panose="020B0609020204030204" pitchFamily="49" charset="0"/>
               </a:rPr>
-              <a:t>Datastore</a:t>
-            </a:r>
-            <a:r>
-              <a:rPr lang="de-DE" sz="1200" dirty="0" err="1">
-                <a:solidFill>
-                  <a:srgbClr val="FFF099"/>
-                </a:solidFill>
-                <a:latin typeface="Consolas" panose="020B0609020204030204" pitchFamily="49" charset="0"/>
-              </a:rPr>
-              <a:t>.ExtensionData.Info.Url.remove</a:t>
-            </a:r>
-            <a:r>
-              <a:rPr lang="de-DE" sz="1200" dirty="0">
-                <a:solidFill>
-                  <a:srgbClr val="EFEFEF"/>
-                </a:solidFill>
-                <a:latin typeface="Consolas" panose="020B0609020204030204" pitchFamily="49" charset="0"/>
-              </a:rPr>
-              <a:t>(</a:t>
-            </a:r>
-            <a:r>
-              <a:rPr lang="de-DE" sz="1200" dirty="0">
-                <a:solidFill>
-                  <a:srgbClr val="E5949B"/>
-                </a:solidFill>
-                <a:latin typeface="Consolas" panose="020B0609020204030204" pitchFamily="49" charset="0"/>
-              </a:rPr>
-              <a:t>0</a:t>
-            </a:r>
-            <a:r>
-              <a:rPr lang="de-DE" sz="1200" dirty="0">
-                <a:solidFill>
-                  <a:srgbClr val="399EF4"/>
-                </a:solidFill>
-                <a:latin typeface="Consolas" panose="020B0609020204030204" pitchFamily="49" charset="0"/>
-              </a:rPr>
-              <a:t>,</a:t>
-            </a:r>
-            <a:r>
-              <a:rPr lang="de-DE" sz="1200" dirty="0">
-                <a:solidFill>
-                  <a:srgbClr val="E5949B"/>
-                </a:solidFill>
-                <a:latin typeface="Consolas" panose="020B0609020204030204" pitchFamily="49" charset="0"/>
-              </a:rPr>
-              <a:t>5</a:t>
-            </a:r>
-            <a:r>
-              <a:rPr lang="de-DE" sz="1200" dirty="0">
-                <a:solidFill>
-                  <a:srgbClr val="EFEFEF"/>
-                </a:solidFill>
-                <a:latin typeface="Consolas" panose="020B0609020204030204" pitchFamily="49" charset="0"/>
-              </a:rPr>
-              <a:t>) </a:t>
-            </a:r>
-            <a:r>
-              <a:rPr lang="de-DE" sz="1200" dirty="0">
-                <a:solidFill>
-                  <a:srgbClr val="399EF4"/>
-                </a:solidFill>
-                <a:latin typeface="Consolas" panose="020B0609020204030204" pitchFamily="49" charset="0"/>
-              </a:rPr>
-              <a:t>+</a:t>
-            </a:r>
-            <a:r>
-              <a:rPr lang="de-DE" sz="1200" dirty="0">
-                <a:solidFill>
-                  <a:srgbClr val="EFEFEF"/>
-                </a:solidFill>
-                <a:latin typeface="Consolas" panose="020B0609020204030204" pitchFamily="49" charset="0"/>
-              </a:rPr>
-              <a:t> </a:t>
-            </a:r>
-            <a:r>
-              <a:rPr lang="de-DE" sz="1200" dirty="0">
-                <a:solidFill>
-                  <a:srgbClr val="399EF4"/>
-                </a:solidFill>
-                <a:latin typeface="Consolas" panose="020B0609020204030204" pitchFamily="49" charset="0"/>
-              </a:rPr>
-              <a:t>$</a:t>
-            </a:r>
-            <a:r>
-              <a:rPr lang="de-DE" sz="1200" dirty="0" err="1">
-                <a:solidFill>
-                  <a:srgbClr val="9FCFF9"/>
-                </a:solidFill>
-                <a:latin typeface="Consolas" panose="020B0609020204030204" pitchFamily="49" charset="0"/>
-              </a:rPr>
-              <a:t>LocalPath</a:t>
-            </a:r>
-            <a:r>
-              <a:rPr lang="de-DE" sz="1200" dirty="0" err="1">
-                <a:solidFill>
-                  <a:srgbClr val="FFF099"/>
-                </a:solidFill>
-                <a:latin typeface="Consolas" panose="020B0609020204030204" pitchFamily="49" charset="0"/>
-              </a:rPr>
-              <a:t>.Split</a:t>
-            </a:r>
-            <a:r>
-              <a:rPr lang="de-DE" sz="1200" dirty="0">
-                <a:solidFill>
-                  <a:srgbClr val="EFEFEF"/>
-                </a:solidFill>
-                <a:latin typeface="Consolas" panose="020B0609020204030204" pitchFamily="49" charset="0"/>
-              </a:rPr>
-              <a:t>(</a:t>
-            </a:r>
-            <a:r>
-              <a:rPr lang="de-DE" sz="1200" dirty="0">
-                <a:solidFill>
-                  <a:srgbClr val="DA6771"/>
-                </a:solidFill>
-                <a:latin typeface="Consolas" panose="020B0609020204030204" pitchFamily="49" charset="0"/>
-              </a:rPr>
-              <a:t>"\"</a:t>
-            </a:r>
-            <a:r>
-              <a:rPr lang="de-DE" sz="1200" dirty="0">
-                <a:solidFill>
-                  <a:srgbClr val="EFEFEF"/>
-                </a:solidFill>
-                <a:latin typeface="Consolas" panose="020B0609020204030204" pitchFamily="49" charset="0"/>
-              </a:rPr>
-              <a:t>)[</a:t>
-            </a:r>
-            <a:r>
-              <a:rPr lang="de-DE" sz="1200" dirty="0">
-                <a:solidFill>
-                  <a:srgbClr val="E5949B"/>
-                </a:solidFill>
-                <a:latin typeface="Consolas" panose="020B0609020204030204" pitchFamily="49" charset="0"/>
-              </a:rPr>
-              <a:t>-1</a:t>
-            </a:r>
-            <a:r>
-              <a:rPr lang="de-DE" sz="1200" dirty="0">
-                <a:solidFill>
-                  <a:srgbClr val="EFEFEF"/>
-                </a:solidFill>
-                <a:latin typeface="Consolas" panose="020B0609020204030204" pitchFamily="49" charset="0"/>
-              </a:rPr>
-              <a:t>]</a:t>
-            </a:r>
-          </a:p>
-          <a:p>
-            <a:r>
-              <a:rPr lang="de-DE" sz="1200" dirty="0">
-                <a:solidFill>
-                  <a:srgbClr val="EFEFEF"/>
-                </a:solidFill>
-                <a:latin typeface="Consolas" panose="020B0609020204030204" pitchFamily="49" charset="0"/>
-              </a:rPr>
-              <a:t/>
-            </a:r>
-            <a:br>
-              <a:rPr lang="de-DE" sz="1200" dirty="0">
-                <a:solidFill>
-                  <a:srgbClr val="EFEFEF"/>
-                </a:solidFill>
-                <a:latin typeface="Consolas" panose="020B0609020204030204" pitchFamily="49" charset="0"/>
-              </a:rPr>
-            </a:br>
-            <a:r>
-              <a:rPr lang="de-DE" sz="1200" i="1" dirty="0">
-                <a:solidFill>
-                  <a:srgbClr val="535A6B"/>
-                </a:solidFill>
-                <a:latin typeface="Consolas" panose="020B0609020204030204" pitchFamily="49" charset="0"/>
-              </a:rPr>
-              <a:t>## </a:t>
-            </a:r>
-            <a:r>
-              <a:rPr lang="de-DE" sz="1200" i="1" dirty="0" err="1">
-                <a:solidFill>
-                  <a:srgbClr val="535A6B"/>
-                </a:solidFill>
-                <a:latin typeface="Consolas" panose="020B0609020204030204" pitchFamily="49" charset="0"/>
-              </a:rPr>
-              <a:t>Install-VMhost</a:t>
+              <a:t>TempDatastoreName</a:t>
             </a:r>
             <a:endParaRPr lang="de-DE" sz="1200" dirty="0">
               <a:solidFill>
@@ -5458,121 +5367,246 @@
           </a:p>
           <a:p>
             <a:r>
+              <a:rPr lang="de-DE" sz="1200" dirty="0">
+                <a:solidFill>
+                  <a:srgbClr val="399EF4"/>
+                </a:solidFill>
+                <a:latin typeface="Consolas" panose="020B0609020204030204" pitchFamily="49" charset="0"/>
+              </a:rPr>
+              <a:t>$</a:t>
+            </a:r>
+            <a:r>
               <a:rPr lang="de-DE" sz="1200" dirty="0" err="1">
                 <a:solidFill>
+                  <a:srgbClr val="9FCFF9"/>
+                </a:solidFill>
+                <a:latin typeface="Consolas" panose="020B0609020204030204" pitchFamily="49" charset="0"/>
+              </a:rPr>
+              <a:t>HostPath</a:t>
+            </a:r>
+            <a:r>
+              <a:rPr lang="de-DE" sz="1200" dirty="0">
+                <a:solidFill>
+                  <a:srgbClr val="EFEFEF"/>
+                </a:solidFill>
+                <a:latin typeface="Consolas" panose="020B0609020204030204" pitchFamily="49" charset="0"/>
+              </a:rPr>
+              <a:t> </a:t>
+            </a:r>
+            <a:r>
+              <a:rPr lang="de-DE" sz="1200" dirty="0">
+                <a:solidFill>
+                  <a:srgbClr val="399EF4"/>
+                </a:solidFill>
+                <a:latin typeface="Consolas" panose="020B0609020204030204" pitchFamily="49" charset="0"/>
+              </a:rPr>
+              <a:t>=</a:t>
+            </a:r>
+            <a:r>
+              <a:rPr lang="de-DE" sz="1200" dirty="0">
+                <a:solidFill>
+                  <a:srgbClr val="EFEFEF"/>
+                </a:solidFill>
+                <a:latin typeface="Consolas" panose="020B0609020204030204" pitchFamily="49" charset="0"/>
+              </a:rPr>
+              <a:t> </a:t>
+            </a:r>
+            <a:r>
+              <a:rPr lang="de-DE" sz="1200" dirty="0">
+                <a:solidFill>
+                  <a:srgbClr val="399EF4"/>
+                </a:solidFill>
+                <a:latin typeface="Consolas" panose="020B0609020204030204" pitchFamily="49" charset="0"/>
+              </a:rPr>
+              <a:t>$</a:t>
+            </a:r>
+            <a:r>
+              <a:rPr lang="de-DE" sz="1200" dirty="0" err="1">
+                <a:solidFill>
+                  <a:srgbClr val="9FCFF9"/>
+                </a:solidFill>
+                <a:latin typeface="Consolas" panose="020B0609020204030204" pitchFamily="49" charset="0"/>
+              </a:rPr>
+              <a:t>Datastore</a:t>
+            </a:r>
+            <a:r>
+              <a:rPr lang="de-DE" sz="1200" dirty="0" err="1">
+                <a:solidFill>
                   <a:srgbClr val="FFF099"/>
                 </a:solidFill>
                 <a:latin typeface="Consolas" panose="020B0609020204030204" pitchFamily="49" charset="0"/>
               </a:rPr>
-              <a:t>Install-VMHostPatch</a:t>
-            </a:r>
-            <a:r>
-              <a:rPr lang="de-DE" sz="1200" dirty="0">
-                <a:solidFill>
-                  <a:srgbClr val="EFEFEF"/>
-                </a:solidFill>
-                <a:latin typeface="Consolas" panose="020B0609020204030204" pitchFamily="49" charset="0"/>
-              </a:rPr>
-              <a:t> </a:t>
-            </a:r>
-            <a:r>
-              <a:rPr lang="de-DE" sz="1200" dirty="0">
-                <a:solidFill>
-                  <a:srgbClr val="399EF4"/>
-                </a:solidFill>
-                <a:latin typeface="Consolas" panose="020B0609020204030204" pitchFamily="49" charset="0"/>
-              </a:rPr>
-              <a:t>-</a:t>
+              <a:t>.ExtensionData.Info.Url.remove</a:t>
+            </a:r>
+            <a:r>
+              <a:rPr lang="de-DE" sz="1200" dirty="0">
+                <a:solidFill>
+                  <a:srgbClr val="EFEFEF"/>
+                </a:solidFill>
+                <a:latin typeface="Consolas" panose="020B0609020204030204" pitchFamily="49" charset="0"/>
+              </a:rPr>
+              <a:t>(</a:t>
+            </a:r>
+            <a:r>
+              <a:rPr lang="de-DE" sz="1200" dirty="0">
+                <a:solidFill>
+                  <a:srgbClr val="E5949B"/>
+                </a:solidFill>
+                <a:latin typeface="Consolas" panose="020B0609020204030204" pitchFamily="49" charset="0"/>
+              </a:rPr>
+              <a:t>0</a:t>
+            </a:r>
+            <a:r>
+              <a:rPr lang="de-DE" sz="1200" dirty="0">
+                <a:solidFill>
+                  <a:srgbClr val="399EF4"/>
+                </a:solidFill>
+                <a:latin typeface="Consolas" panose="020B0609020204030204" pitchFamily="49" charset="0"/>
+              </a:rPr>
+              <a:t>,</a:t>
+            </a:r>
+            <a:r>
+              <a:rPr lang="de-DE" sz="1200" dirty="0">
+                <a:solidFill>
+                  <a:srgbClr val="E5949B"/>
+                </a:solidFill>
+                <a:latin typeface="Consolas" panose="020B0609020204030204" pitchFamily="49" charset="0"/>
+              </a:rPr>
+              <a:t>5</a:t>
+            </a:r>
+            <a:r>
+              <a:rPr lang="de-DE" sz="1200" dirty="0">
+                <a:solidFill>
+                  <a:srgbClr val="EFEFEF"/>
+                </a:solidFill>
+                <a:latin typeface="Consolas" panose="020B0609020204030204" pitchFamily="49" charset="0"/>
+              </a:rPr>
+              <a:t>) </a:t>
+            </a:r>
+            <a:r>
+              <a:rPr lang="de-DE" sz="1200" dirty="0">
+                <a:solidFill>
+                  <a:srgbClr val="399EF4"/>
+                </a:solidFill>
+                <a:latin typeface="Consolas" panose="020B0609020204030204" pitchFamily="49" charset="0"/>
+              </a:rPr>
+              <a:t>+</a:t>
+            </a:r>
+            <a:r>
+              <a:rPr lang="de-DE" sz="1200" dirty="0">
+                <a:solidFill>
+                  <a:srgbClr val="EFEFEF"/>
+                </a:solidFill>
+                <a:latin typeface="Consolas" panose="020B0609020204030204" pitchFamily="49" charset="0"/>
+              </a:rPr>
+              <a:t> </a:t>
+            </a:r>
+            <a:r>
+              <a:rPr lang="de-DE" sz="1200" dirty="0">
+                <a:solidFill>
+                  <a:srgbClr val="399EF4"/>
+                </a:solidFill>
+                <a:latin typeface="Consolas" panose="020B0609020204030204" pitchFamily="49" charset="0"/>
+              </a:rPr>
+              <a:t>$</a:t>
             </a:r>
             <a:r>
               <a:rPr lang="de-DE" sz="1200" dirty="0" err="1">
                 <a:solidFill>
-                  <a:srgbClr val="EFEFEF"/>
-                </a:solidFill>
-                <a:latin typeface="Consolas" panose="020B0609020204030204" pitchFamily="49" charset="0"/>
-              </a:rPr>
-              <a:t>VMHost</a:t>
-            </a:r>
-            <a:r>
-              <a:rPr lang="de-DE" sz="1200" dirty="0">
-                <a:solidFill>
-                  <a:srgbClr val="EFEFEF"/>
-                </a:solidFill>
-                <a:latin typeface="Consolas" panose="020B0609020204030204" pitchFamily="49" charset="0"/>
-              </a:rPr>
-              <a:t> </a:t>
-            </a:r>
-            <a:r>
-              <a:rPr lang="de-DE" sz="1200" dirty="0">
-                <a:solidFill>
-                  <a:srgbClr val="399EF4"/>
-                </a:solidFill>
-                <a:latin typeface="Consolas" panose="020B0609020204030204" pitchFamily="49" charset="0"/>
-              </a:rPr>
-              <a:t>$</a:t>
+                  <a:srgbClr val="9FCFF9"/>
+                </a:solidFill>
+                <a:latin typeface="Consolas" panose="020B0609020204030204" pitchFamily="49" charset="0"/>
+              </a:rPr>
+              <a:t>LocalPath</a:t>
             </a:r>
             <a:r>
               <a:rPr lang="de-DE" sz="1200" dirty="0" err="1">
                 <a:solidFill>
-                  <a:srgbClr val="9FCFF9"/>
-                </a:solidFill>
-                <a:latin typeface="Consolas" panose="020B0609020204030204" pitchFamily="49" charset="0"/>
-              </a:rPr>
-              <a:t>VMHost</a:t>
-            </a:r>
-            <a:r>
-              <a:rPr lang="de-DE" sz="1200" dirty="0">
-                <a:solidFill>
-                  <a:srgbClr val="EFEFEF"/>
-                </a:solidFill>
-                <a:latin typeface="Consolas" panose="020B0609020204030204" pitchFamily="49" charset="0"/>
-              </a:rPr>
-              <a:t> </a:t>
-            </a:r>
-            <a:r>
-              <a:rPr lang="de-DE" sz="1200" dirty="0">
-                <a:solidFill>
-                  <a:srgbClr val="399EF4"/>
-                </a:solidFill>
-                <a:latin typeface="Consolas" panose="020B0609020204030204" pitchFamily="49" charset="0"/>
-              </a:rPr>
-              <a:t>-</a:t>
-            </a:r>
-            <a:r>
-              <a:rPr lang="de-DE" sz="1200" dirty="0" err="1">
-                <a:solidFill>
-                  <a:srgbClr val="EFEFEF"/>
-                </a:solidFill>
-                <a:latin typeface="Consolas" panose="020B0609020204030204" pitchFamily="49" charset="0"/>
-              </a:rPr>
-              <a:t>HostPath</a:t>
-            </a:r>
-            <a:r>
-              <a:rPr lang="de-DE" sz="1200" dirty="0">
-                <a:solidFill>
-                  <a:srgbClr val="EFEFEF"/>
-                </a:solidFill>
-                <a:latin typeface="Consolas" panose="020B0609020204030204" pitchFamily="49" charset="0"/>
-              </a:rPr>
-              <a:t> </a:t>
-            </a:r>
-            <a:r>
-              <a:rPr lang="de-DE" sz="1200" dirty="0">
-                <a:solidFill>
-                  <a:srgbClr val="399EF4"/>
-                </a:solidFill>
-                <a:latin typeface="Consolas" panose="020B0609020204030204" pitchFamily="49" charset="0"/>
-              </a:rPr>
-              <a:t>$</a:t>
-            </a:r>
-            <a:r>
-              <a:rPr lang="de-DE" sz="1200" dirty="0" err="1">
-                <a:solidFill>
-                  <a:srgbClr val="9FCFF9"/>
-                </a:solidFill>
-                <a:latin typeface="Consolas" panose="020B0609020204030204" pitchFamily="49" charset="0"/>
-              </a:rPr>
-              <a:t>HostPath</a:t>
+                  <a:srgbClr val="FFF099"/>
+                </a:solidFill>
+                <a:latin typeface="Consolas" panose="020B0609020204030204" pitchFamily="49" charset="0"/>
+              </a:rPr>
+              <a:t>.Split</a:t>
+            </a:r>
+            <a:r>
+              <a:rPr lang="de-DE" sz="1200" dirty="0">
+                <a:solidFill>
+                  <a:srgbClr val="EFEFEF"/>
+                </a:solidFill>
+                <a:latin typeface="Consolas" panose="020B0609020204030204" pitchFamily="49" charset="0"/>
+              </a:rPr>
+              <a:t>(</a:t>
+            </a:r>
+            <a:r>
+              <a:rPr lang="de-DE" sz="1200" dirty="0">
+                <a:solidFill>
+                  <a:srgbClr val="DA6771"/>
+                </a:solidFill>
+                <a:latin typeface="Consolas" panose="020B0609020204030204" pitchFamily="49" charset="0"/>
+              </a:rPr>
+              <a:t>"\"</a:t>
+            </a:r>
+            <a:r>
+              <a:rPr lang="de-DE" sz="1200" dirty="0">
+                <a:solidFill>
+                  <a:srgbClr val="EFEFEF"/>
+                </a:solidFill>
+                <a:latin typeface="Consolas" panose="020B0609020204030204" pitchFamily="49" charset="0"/>
+              </a:rPr>
+              <a:t>)[</a:t>
+            </a:r>
+            <a:r>
+              <a:rPr lang="de-DE" sz="1200" dirty="0">
+                <a:solidFill>
+                  <a:srgbClr val="E5949B"/>
+                </a:solidFill>
+                <a:latin typeface="Consolas" panose="020B0609020204030204" pitchFamily="49" charset="0"/>
+              </a:rPr>
+              <a:t>-1</a:t>
+            </a:r>
+            <a:r>
+              <a:rPr lang="de-DE" sz="1200" dirty="0" smtClean="0">
+                <a:solidFill>
+                  <a:srgbClr val="EFEFEF"/>
+                </a:solidFill>
+                <a:latin typeface="Consolas" panose="020B0609020204030204" pitchFamily="49" charset="0"/>
+              </a:rPr>
+              <a:t>]</a:t>
+            </a:r>
+            <a:r>
+              <a:rPr lang="de-DE" sz="1200" dirty="0">
+                <a:solidFill>
+                  <a:srgbClr val="EFEFEF"/>
+                </a:solidFill>
+                <a:latin typeface="Consolas" panose="020B0609020204030204" pitchFamily="49" charset="0"/>
+              </a:rPr>
+              <a:t/>
+            </a:r>
+            <a:br>
+              <a:rPr lang="de-DE" sz="1200" dirty="0">
+                <a:solidFill>
+                  <a:srgbClr val="EFEFEF"/>
+                </a:solidFill>
+                <a:latin typeface="Consolas" panose="020B0609020204030204" pitchFamily="49" charset="0"/>
+              </a:rPr>
+            </a:br>
+            <a:r>
+              <a:rPr lang="de-DE" sz="1200" i="1" dirty="0">
+                <a:solidFill>
+                  <a:srgbClr val="535A6B"/>
+                </a:solidFill>
+                <a:latin typeface="Consolas" panose="020B0609020204030204" pitchFamily="49" charset="0"/>
+              </a:rPr>
+              <a:t>## </a:t>
+            </a:r>
+            <a:r>
+              <a:rPr lang="de-DE" sz="1200" i="1" dirty="0" err="1">
+                <a:solidFill>
+                  <a:srgbClr val="535A6B"/>
+                </a:solidFill>
+                <a:latin typeface="Consolas" panose="020B0609020204030204" pitchFamily="49" charset="0"/>
+              </a:rPr>
+              <a:t>Install-VMhost</a:t>
             </a:r>
             <a:endParaRPr lang="de-DE" sz="1200" dirty="0">
               <a:solidFill>
@@ -5582,6 +5616,123 @@
             </a:endParaRPr>
           </a:p>
           <a:p>
+            <a:r>
+              <a:rPr lang="de-DE" sz="1200" dirty="0" err="1">
+                <a:solidFill>
+                  <a:srgbClr val="FFF099"/>
+                </a:solidFill>
+                <a:latin typeface="Consolas" panose="020B0609020204030204" pitchFamily="49" charset="0"/>
+              </a:rPr>
+              <a:t>Install-VMHostPatch</a:t>
+            </a:r>
+            <a:r>
+              <a:rPr lang="de-DE" sz="1200" dirty="0">
+                <a:solidFill>
+                  <a:srgbClr val="EFEFEF"/>
+                </a:solidFill>
+                <a:latin typeface="Consolas" panose="020B0609020204030204" pitchFamily="49" charset="0"/>
+              </a:rPr>
+              <a:t> </a:t>
+            </a:r>
+            <a:r>
+              <a:rPr lang="de-DE" sz="1200" dirty="0">
+                <a:solidFill>
+                  <a:srgbClr val="399EF4"/>
+                </a:solidFill>
+                <a:latin typeface="Consolas" panose="020B0609020204030204" pitchFamily="49" charset="0"/>
+              </a:rPr>
+              <a:t>-</a:t>
+            </a:r>
+            <a:r>
+              <a:rPr lang="de-DE" sz="1200" dirty="0" err="1">
+                <a:solidFill>
+                  <a:srgbClr val="EFEFEF"/>
+                </a:solidFill>
+                <a:latin typeface="Consolas" panose="020B0609020204030204" pitchFamily="49" charset="0"/>
+              </a:rPr>
+              <a:t>VMHost</a:t>
+            </a:r>
+            <a:r>
+              <a:rPr lang="de-DE" sz="1200" dirty="0">
+                <a:solidFill>
+                  <a:srgbClr val="EFEFEF"/>
+                </a:solidFill>
+                <a:latin typeface="Consolas" panose="020B0609020204030204" pitchFamily="49" charset="0"/>
+              </a:rPr>
+              <a:t> </a:t>
+            </a:r>
+            <a:r>
+              <a:rPr lang="de-DE" sz="1200" dirty="0">
+                <a:solidFill>
+                  <a:srgbClr val="399EF4"/>
+                </a:solidFill>
+                <a:latin typeface="Consolas" panose="020B0609020204030204" pitchFamily="49" charset="0"/>
+              </a:rPr>
+              <a:t>$</a:t>
+            </a:r>
+            <a:r>
+              <a:rPr lang="de-DE" sz="1200" dirty="0" err="1">
+                <a:solidFill>
+                  <a:srgbClr val="9FCFF9"/>
+                </a:solidFill>
+                <a:latin typeface="Consolas" panose="020B0609020204030204" pitchFamily="49" charset="0"/>
+              </a:rPr>
+              <a:t>VMHost</a:t>
+            </a:r>
+            <a:r>
+              <a:rPr lang="de-DE" sz="1200" dirty="0">
+                <a:solidFill>
+                  <a:srgbClr val="EFEFEF"/>
+                </a:solidFill>
+                <a:latin typeface="Consolas" panose="020B0609020204030204" pitchFamily="49" charset="0"/>
+              </a:rPr>
+              <a:t> </a:t>
+            </a:r>
+            <a:r>
+              <a:rPr lang="de-DE" sz="1200" dirty="0">
+                <a:solidFill>
+                  <a:srgbClr val="399EF4"/>
+                </a:solidFill>
+                <a:latin typeface="Consolas" panose="020B0609020204030204" pitchFamily="49" charset="0"/>
+              </a:rPr>
+              <a:t>-</a:t>
+            </a:r>
+            <a:r>
+              <a:rPr lang="de-DE" sz="1200" dirty="0" err="1">
+                <a:solidFill>
+                  <a:srgbClr val="EFEFEF"/>
+                </a:solidFill>
+                <a:latin typeface="Consolas" panose="020B0609020204030204" pitchFamily="49" charset="0"/>
+              </a:rPr>
+              <a:t>HostPath</a:t>
+            </a:r>
+            <a:r>
+              <a:rPr lang="de-DE" sz="1200" dirty="0">
+                <a:solidFill>
+                  <a:srgbClr val="EFEFEF"/>
+                </a:solidFill>
+                <a:latin typeface="Consolas" panose="020B0609020204030204" pitchFamily="49" charset="0"/>
+              </a:rPr>
+              <a:t> </a:t>
+            </a:r>
+            <a:r>
+              <a:rPr lang="de-DE" sz="1200" dirty="0">
+                <a:solidFill>
+                  <a:srgbClr val="399EF4"/>
+                </a:solidFill>
+                <a:latin typeface="Consolas" panose="020B0609020204030204" pitchFamily="49" charset="0"/>
+              </a:rPr>
+              <a:t>$</a:t>
+            </a:r>
+            <a:r>
+              <a:rPr lang="de-DE" sz="1200" dirty="0" err="1" smtClean="0">
+                <a:solidFill>
+                  <a:srgbClr val="9FCFF9"/>
+                </a:solidFill>
+                <a:latin typeface="Consolas" panose="020B0609020204030204" pitchFamily="49" charset="0"/>
+              </a:rPr>
+              <a:t>HostPath</a:t>
+            </a:r>
             <a:r>
               <a:rPr lang="de-DE" sz="1200" dirty="0">
                 <a:solidFill>

</xml_diff>